<commit_message>
fixed classification markings and title slide
</commit_message>
<xml_diff>
--- a/Python/Lesson 03 - File IO/Python File IO.pptx
+++ b/Python/Lesson 03 - File IO/Python File IO.pptx
@@ -2373,7 +2373,7 @@
                 <a:latin typeface="+mn-lt"/>
                 <a:cs typeface="Arial Bold" panose="020B0704020202020204" pitchFamily="34" charset="0"/>
               </a:rPr>
-              <a:t>UNCLASSIFIED / GENERAL</a:t>
+              <a:t>UNCLASSIFIED</a:t>
             </a:r>
           </a:p>
         </p:txBody>
@@ -2425,7 +2425,7 @@
                 <a:latin typeface="+mn-lt"/>
                 <a:cs typeface="Arial Bold" panose="020B0704020202020204" pitchFamily="34" charset="0"/>
               </a:rPr>
-              <a:t>UNCLASSIFIED / GENERAL</a:t>
+              <a:t>UNCLASSIFIED</a:t>
             </a:r>
           </a:p>
         </p:txBody>
@@ -5039,14 +5039,14 @@
               <a:defRPr/>
             </a:pPr>
             <a:r>
-              <a:rPr lang="en-US" sz="700" b="1">
+              <a:rPr lang="en-US" sz="700" b="1" dirty="0">
                 <a:solidFill>
-                  <a:schemeClr val="tx1"/>
+                  <a:srgbClr val="2DAA27"/>
                 </a:solidFill>
                 <a:latin typeface="+mn-lt"/>
                 <a:cs typeface="Arial Bold" panose="020B0704020202020204" pitchFamily="34" charset="0"/>
               </a:rPr>
-              <a:t>EDIT CONTROL STATEMENT UNDER &gt; VIEW &gt; SLIDE MASTER &gt; SCROLL TO TOP &gt; CHANGE HEADER AND FOOTER</a:t>
+              <a:t>UNCLASSIFIED</a:t>
             </a:r>
           </a:p>
         </p:txBody>
@@ -5091,15 +5091,22 @@
               <a:defRPr/>
             </a:pPr>
             <a:r>
-              <a:rPr lang="en-US" sz="700" b="1">
+              <a:rPr lang="en-US" sz="700" b="1" dirty="0">
                 <a:solidFill>
-                  <a:schemeClr val="tx1"/>
+                  <a:srgbClr val="2DAA27"/>
                 </a:solidFill>
                 <a:latin typeface="+mn-lt"/>
                 <a:cs typeface="Arial Bold" panose="020B0704020202020204" pitchFamily="34" charset="0"/>
               </a:rPr>
-              <a:t>EDIT CONTROL STATEMENT UNDER &gt; VIEW &gt; SLIDE MASTER &gt; SCROLL TO TOP &gt; CHANGE HEADER AND FOOTER</a:t>
-            </a:r>
+              <a:t>UNCLASSIFIED</a:t>
+            </a:r>
+            <a:endParaRPr lang="en-US" sz="700" b="1" dirty="0">
+              <a:solidFill>
+                <a:schemeClr val="tx1"/>
+              </a:solidFill>
+              <a:latin typeface="+mn-lt"/>
+              <a:cs typeface="Arial Bold" panose="020B0704020202020204" pitchFamily="34" charset="0"/>
+            </a:endParaRPr>
           </a:p>
         </p:txBody>
       </p:sp>
@@ -10381,15 +10388,22 @@
               <a:defRPr/>
             </a:pPr>
             <a:r>
-              <a:rPr lang="en-US" sz="700" b="1">
+              <a:rPr lang="en-US" sz="700" b="1" dirty="0">
                 <a:solidFill>
-                  <a:schemeClr val="tx1"/>
+                  <a:srgbClr val="2DAA27"/>
                 </a:solidFill>
                 <a:latin typeface="+mn-lt"/>
                 <a:cs typeface="Arial Bold" panose="020B0704020202020204" pitchFamily="34" charset="0"/>
               </a:rPr>
-              <a:t>EDIT CONTROL STATEMENT UNDER &gt; VIEW &gt; SLIDE MASTER &gt; SCROLL TO TOP &gt; CHANGE HEADER AND FOOTER</a:t>
-            </a:r>
+              <a:t>UNCLASSIFIED</a:t>
+            </a:r>
+            <a:endParaRPr lang="en-US" sz="700" b="1" dirty="0">
+              <a:solidFill>
+                <a:schemeClr val="tx1"/>
+              </a:solidFill>
+              <a:latin typeface="+mn-lt"/>
+              <a:cs typeface="Arial Bold" panose="020B0704020202020204" pitchFamily="34" charset="0"/>
+            </a:endParaRPr>
           </a:p>
         </p:txBody>
       </p:sp>
@@ -10435,13 +10449,20 @@
             <a:r>
               <a:rPr lang="en-US" sz="700" b="1" dirty="0">
                 <a:solidFill>
-                  <a:schemeClr val="tx1"/>
+                  <a:srgbClr val="2DAA27"/>
                 </a:solidFill>
                 <a:latin typeface="+mn-lt"/>
                 <a:cs typeface="Arial Bold" panose="020B0704020202020204" pitchFamily="34" charset="0"/>
               </a:rPr>
-              <a:t>EDIT CONTROL STATEMENT UNDER &gt; VIEW &gt; SLIDE MASTER &gt; SCROLL TO TOP &gt; CHANGE HEADER AND FOOTER</a:t>
-            </a:r>
+              <a:t>UNCLASSIFIED</a:t>
+            </a:r>
+            <a:endParaRPr lang="en-US" sz="700" b="1" dirty="0">
+              <a:solidFill>
+                <a:schemeClr val="tx1"/>
+              </a:solidFill>
+              <a:latin typeface="+mn-lt"/>
+              <a:cs typeface="Arial Bold" panose="020B0704020202020204" pitchFamily="34" charset="0"/>
+            </a:endParaRPr>
           </a:p>
         </p:txBody>
       </p:sp>
@@ -13318,15 +13339,22 @@
               <a:defRPr/>
             </a:pPr>
             <a:r>
-              <a:rPr lang="en-US" sz="700" b="1">
+              <a:rPr lang="en-US" sz="700" b="1" dirty="0">
                 <a:solidFill>
-                  <a:schemeClr val="tx1"/>
+                  <a:srgbClr val="2DAA27"/>
                 </a:solidFill>
                 <a:latin typeface="+mn-lt"/>
                 <a:cs typeface="Arial Bold" panose="020B0704020202020204" pitchFamily="34" charset="0"/>
               </a:rPr>
-              <a:t>EDIT CONTROL STATEMENT UNDER &gt; VIEW &gt; SLIDE MASTER &gt; SCROLL TO TOP &gt; CHANGE HEADER AND FOOTER</a:t>
-            </a:r>
+              <a:t>UNCLASSIFIED</a:t>
+            </a:r>
+            <a:endParaRPr lang="en-US" sz="700" b="1" dirty="0">
+              <a:solidFill>
+                <a:schemeClr val="tx1"/>
+              </a:solidFill>
+              <a:latin typeface="+mn-lt"/>
+              <a:cs typeface="Arial Bold" panose="020B0704020202020204" pitchFamily="34" charset="0"/>
+            </a:endParaRPr>
           </a:p>
         </p:txBody>
       </p:sp>
@@ -13370,15 +13398,22 @@
               <a:defRPr/>
             </a:pPr>
             <a:r>
-              <a:rPr lang="en-US" sz="700" b="1">
+              <a:rPr lang="en-US" sz="700" b="1" dirty="0">
                 <a:solidFill>
-                  <a:schemeClr val="tx1"/>
+                  <a:srgbClr val="2DAA27"/>
                 </a:solidFill>
                 <a:latin typeface="+mn-lt"/>
                 <a:cs typeface="Arial Bold" panose="020B0704020202020204" pitchFamily="34" charset="0"/>
               </a:rPr>
-              <a:t>EDIT CONTROL STATEMENT UNDER &gt; VIEW &gt; SLIDE MASTER &gt; SCROLL TO TOP &gt; CHANGE HEADER AND FOOTER</a:t>
-            </a:r>
+              <a:t>UNCLASSIFIED</a:t>
+            </a:r>
+            <a:endParaRPr lang="en-US" sz="700" b="1" dirty="0">
+              <a:solidFill>
+                <a:schemeClr val="tx1"/>
+              </a:solidFill>
+              <a:latin typeface="+mn-lt"/>
+              <a:cs typeface="Arial Bold" panose="020B0704020202020204" pitchFamily="34" charset="0"/>
+            </a:endParaRPr>
           </a:p>
         </p:txBody>
       </p:sp>
@@ -14032,15 +14067,22 @@
               <a:defRPr/>
             </a:pPr>
             <a:r>
-              <a:rPr lang="en-US" sz="700" b="1">
+              <a:rPr lang="en-US" sz="700" b="1" dirty="0">
                 <a:solidFill>
-                  <a:schemeClr val="tx1"/>
+                  <a:srgbClr val="2DAA27"/>
                 </a:solidFill>
                 <a:latin typeface="+mn-lt"/>
                 <a:cs typeface="Arial Bold" panose="020B0704020202020204" pitchFamily="34" charset="0"/>
               </a:rPr>
-              <a:t>EDIT CONTROL STATEMENT UNDER &gt; VIEW &gt; SLIDE MASTER &gt; SCROLL TO TOP &gt; CHANGE HEADER AND FOOTER</a:t>
-            </a:r>
+              <a:t>UNCLASSIFIED</a:t>
+            </a:r>
+            <a:endParaRPr lang="en-US" sz="700" b="1" dirty="0">
+              <a:solidFill>
+                <a:schemeClr val="tx1"/>
+              </a:solidFill>
+              <a:latin typeface="+mn-lt"/>
+              <a:cs typeface="Arial Bold" panose="020B0704020202020204" pitchFamily="34" charset="0"/>
+            </a:endParaRPr>
           </a:p>
         </p:txBody>
       </p:sp>
@@ -14084,15 +14126,22 @@
               <a:defRPr/>
             </a:pPr>
             <a:r>
-              <a:rPr lang="en-US" sz="700" b="1">
+              <a:rPr lang="en-US" sz="700" b="1" dirty="0">
                 <a:solidFill>
-                  <a:schemeClr val="tx1"/>
+                  <a:srgbClr val="2DAA27"/>
                 </a:solidFill>
                 <a:latin typeface="+mn-lt"/>
                 <a:cs typeface="Arial Bold" panose="020B0704020202020204" pitchFamily="34" charset="0"/>
               </a:rPr>
-              <a:t>EDIT CONTROL STATEMENT UNDER &gt; VIEW &gt; SLIDE MASTER &gt; SCROLL TO TOP &gt; CHANGE HEADER AND FOOTER</a:t>
-            </a:r>
+              <a:t>UNCLASSIFIED</a:t>
+            </a:r>
+            <a:endParaRPr lang="en-US" sz="700" b="1" dirty="0">
+              <a:solidFill>
+                <a:schemeClr val="tx1"/>
+              </a:solidFill>
+              <a:latin typeface="+mn-lt"/>
+              <a:cs typeface="Arial Bold" panose="020B0704020202020204" pitchFamily="34" charset="0"/>
+            </a:endParaRPr>
           </a:p>
         </p:txBody>
       </p:sp>
@@ -14381,15 +14430,22 @@
               <a:defRPr/>
             </a:pPr>
             <a:r>
-              <a:rPr lang="en-US" sz="700" b="1">
+              <a:rPr lang="en-US" sz="700" b="1" dirty="0">
                 <a:solidFill>
-                  <a:schemeClr val="tx1"/>
+                  <a:srgbClr val="2DAA27"/>
                 </a:solidFill>
                 <a:latin typeface="+mn-lt"/>
                 <a:cs typeface="Arial Bold" panose="020B0704020202020204" pitchFamily="34" charset="0"/>
               </a:rPr>
-              <a:t>EDIT CONTROL STATEMENT UNDER &gt; VIEW &gt; SLIDE MASTER &gt; SCROLL TO TOP &gt; CHANGE HEADER AND FOOTER</a:t>
-            </a:r>
+              <a:t>UNCLASSIFIED</a:t>
+            </a:r>
+            <a:endParaRPr lang="en-US" sz="700" b="1" dirty="0">
+              <a:solidFill>
+                <a:schemeClr val="tx1"/>
+              </a:solidFill>
+              <a:latin typeface="+mn-lt"/>
+              <a:cs typeface="Arial Bold" panose="020B0704020202020204" pitchFamily="34" charset="0"/>
+            </a:endParaRPr>
           </a:p>
         </p:txBody>
       </p:sp>
@@ -14433,15 +14489,22 @@
               <a:defRPr/>
             </a:pPr>
             <a:r>
-              <a:rPr lang="en-US" sz="700" b="1">
+              <a:rPr lang="en-US" sz="700" b="1" dirty="0">
                 <a:solidFill>
-                  <a:schemeClr val="tx1"/>
+                  <a:srgbClr val="2DAA27"/>
                 </a:solidFill>
                 <a:latin typeface="+mn-lt"/>
                 <a:cs typeface="Arial Bold" panose="020B0704020202020204" pitchFamily="34" charset="0"/>
               </a:rPr>
-              <a:t>EDIT CONTROL STATEMENT UNDER &gt; VIEW &gt; SLIDE MASTER &gt; SCROLL TO TOP &gt; CHANGE HEADER AND FOOTER</a:t>
-            </a:r>
+              <a:t>UNCLASSIFIED</a:t>
+            </a:r>
+            <a:endParaRPr lang="en-US" sz="700" b="1" dirty="0">
+              <a:solidFill>
+                <a:schemeClr val="tx1"/>
+              </a:solidFill>
+              <a:latin typeface="+mn-lt"/>
+              <a:cs typeface="Arial Bold" panose="020B0704020202020204" pitchFamily="34" charset="0"/>
+            </a:endParaRPr>
           </a:p>
         </p:txBody>
       </p:sp>
@@ -16453,7 +16516,7 @@
                 <a:latin typeface="+mn-lt"/>
                 <a:cs typeface="Arial Bold" panose="020B0704020202020204" pitchFamily="34" charset="0"/>
               </a:rPr>
-              <a:t>UNCLASSIFIED / GENERAL</a:t>
+              <a:t>UNCLASSIFIED</a:t>
             </a:r>
           </a:p>
         </p:txBody>
@@ -16505,7 +16568,7 @@
                 <a:latin typeface="+mn-lt"/>
                 <a:cs typeface="Arial Bold" panose="020B0704020202020204" pitchFamily="34" charset="0"/>
               </a:rPr>
-              <a:t>UNCLASSIFIED / GENERAL</a:t>
+              <a:t>UNCLASSIFIED</a:t>
             </a:r>
           </a:p>
         </p:txBody>
@@ -19115,7 +19178,7 @@
                 <a:latin typeface="+mn-lt"/>
                 <a:cs typeface="Arial Bold" panose="020B0704020202020204" pitchFamily="34" charset="0"/>
               </a:rPr>
-              <a:t>UNCLASSIFIED / GENERAL</a:t>
+              <a:t>UNCLASSIFIED</a:t>
             </a:r>
           </a:p>
         </p:txBody>
@@ -19167,7 +19230,7 @@
                 <a:latin typeface="+mn-lt"/>
                 <a:cs typeface="Arial Bold" panose="020B0704020202020204" pitchFamily="34" charset="0"/>
               </a:rPr>
-              <a:t>UNCLASSIFIED / GENERAL</a:t>
+              <a:t>UNCLASSIFIED</a:t>
             </a:r>
           </a:p>
         </p:txBody>
@@ -22410,7 +22473,7 @@
                 <a:latin typeface="+mn-lt"/>
                 <a:cs typeface="Arial Bold" panose="020B0704020202020204" pitchFamily="34" charset="0"/>
               </a:rPr>
-              <a:t>UNCLASSIFIED / GENERAL</a:t>
+              <a:t>UNCLASSIFIED</a:t>
             </a:r>
           </a:p>
         </p:txBody>
@@ -22462,7 +22525,7 @@
                 <a:latin typeface="+mn-lt"/>
                 <a:cs typeface="Arial Bold" panose="020B0704020202020204" pitchFamily="34" charset="0"/>
               </a:rPr>
-              <a:t>UNCLASSIFIED / GENERAL</a:t>
+              <a:t>UNCLASSIFIED</a:t>
             </a:r>
           </a:p>
         </p:txBody>
@@ -25598,15 +25661,22 @@
               <a:defRPr/>
             </a:pPr>
             <a:r>
-              <a:rPr lang="en-US" sz="700" b="1">
+              <a:rPr lang="en-US" sz="700" b="1" dirty="0">
                 <a:solidFill>
-                  <a:schemeClr val="tx1"/>
+                  <a:srgbClr val="2DAA27"/>
                 </a:solidFill>
                 <a:latin typeface="+mn-lt"/>
                 <a:cs typeface="Arial Bold" panose="020B0704020202020204" pitchFamily="34" charset="0"/>
               </a:rPr>
-              <a:t>EDIT CONTROL STATEMENT UNDER &gt; VIEW &gt; SLIDE MASTER &gt; SCROLL TO TOP &gt; CHANGE HEADER AND FOOTER</a:t>
-            </a:r>
+              <a:t>UNCLASSIFIED</a:t>
+            </a:r>
+            <a:endParaRPr lang="en-US" sz="700" b="1" dirty="0">
+              <a:solidFill>
+                <a:schemeClr val="tx1"/>
+              </a:solidFill>
+              <a:latin typeface="+mn-lt"/>
+              <a:cs typeface="Arial Bold" panose="020B0704020202020204" pitchFamily="34" charset="0"/>
+            </a:endParaRPr>
           </a:p>
         </p:txBody>
       </p:sp>
@@ -25650,15 +25720,22 @@
               <a:defRPr/>
             </a:pPr>
             <a:r>
-              <a:rPr lang="en-US" sz="700" b="1">
+              <a:rPr lang="en-US" sz="700" b="1" dirty="0">
                 <a:solidFill>
-                  <a:schemeClr val="tx1"/>
+                  <a:srgbClr val="2DAA27"/>
                 </a:solidFill>
                 <a:latin typeface="+mn-lt"/>
                 <a:cs typeface="Arial Bold" panose="020B0704020202020204" pitchFamily="34" charset="0"/>
               </a:rPr>
-              <a:t>EDIT CONTROL STATEMENT UNDER &gt; VIEW &gt; SLIDE MASTER &gt; SCROLL TO TOP &gt; CHANGE HEADER AND FOOTER</a:t>
-            </a:r>
+              <a:t>UNCLASSIFIED</a:t>
+            </a:r>
+            <a:endParaRPr lang="en-US" sz="700" b="1" dirty="0">
+              <a:solidFill>
+                <a:schemeClr val="tx1"/>
+              </a:solidFill>
+              <a:latin typeface="+mn-lt"/>
+              <a:cs typeface="Arial Bold" panose="020B0704020202020204" pitchFamily="34" charset="0"/>
+            </a:endParaRPr>
           </a:p>
         </p:txBody>
       </p:sp>
@@ -28316,15 +28393,22 @@
               <a:defRPr/>
             </a:pPr>
             <a:r>
-              <a:rPr lang="en-US" sz="700" b="1">
+              <a:rPr lang="en-US" sz="700" b="1" dirty="0">
                 <a:solidFill>
-                  <a:schemeClr val="tx1"/>
+                  <a:srgbClr val="2DAA27"/>
                 </a:solidFill>
                 <a:latin typeface="+mn-lt"/>
                 <a:cs typeface="Arial Bold" panose="020B0704020202020204" pitchFamily="34" charset="0"/>
               </a:rPr>
-              <a:t>EDIT CONTROL STATEMENT UNDER &gt; VIEW &gt; SLIDE MASTER &gt; SCROLL TO TOP &gt; CHANGE HEADER AND FOOTER</a:t>
-            </a:r>
+              <a:t>UNCLASSIFIED</a:t>
+            </a:r>
+            <a:endParaRPr lang="en-US" sz="700" b="1" dirty="0">
+              <a:solidFill>
+                <a:schemeClr val="tx1"/>
+              </a:solidFill>
+              <a:latin typeface="+mn-lt"/>
+              <a:cs typeface="Arial Bold" panose="020B0704020202020204" pitchFamily="34" charset="0"/>
+            </a:endParaRPr>
           </a:p>
         </p:txBody>
       </p:sp>
@@ -28368,15 +28452,22 @@
               <a:defRPr/>
             </a:pPr>
             <a:r>
-              <a:rPr lang="en-US" sz="700" b="1">
+              <a:rPr lang="en-US" sz="700" b="1" dirty="0">
                 <a:solidFill>
-                  <a:schemeClr val="tx1"/>
+                  <a:srgbClr val="2DAA27"/>
                 </a:solidFill>
                 <a:latin typeface="+mn-lt"/>
                 <a:cs typeface="Arial Bold" panose="020B0704020202020204" pitchFamily="34" charset="0"/>
               </a:rPr>
-              <a:t>EDIT CONTROL STATEMENT UNDER &gt; VIEW &gt; SLIDE MASTER &gt; SCROLL TO TOP &gt; CHANGE HEADER AND FOOTER</a:t>
-            </a:r>
+              <a:t>UNCLASSIFIED</a:t>
+            </a:r>
+            <a:endParaRPr lang="en-US" sz="700" b="1" dirty="0">
+              <a:solidFill>
+                <a:schemeClr val="tx1"/>
+              </a:solidFill>
+              <a:latin typeface="+mn-lt"/>
+              <a:cs typeface="Arial Bold" panose="020B0704020202020204" pitchFamily="34" charset="0"/>
+            </a:endParaRPr>
           </a:p>
         </p:txBody>
       </p:sp>
@@ -33902,15 +33993,22 @@
               <a:defRPr/>
             </a:pPr>
             <a:r>
-              <a:rPr lang="en-US" sz="700" b="1">
+              <a:rPr lang="en-US" sz="700" b="1" dirty="0">
                 <a:solidFill>
-                  <a:schemeClr val="tx1"/>
+                  <a:srgbClr val="2DAA27"/>
                 </a:solidFill>
                 <a:latin typeface="+mn-lt"/>
                 <a:cs typeface="Arial Bold" panose="020B0704020202020204" pitchFamily="34" charset="0"/>
               </a:rPr>
-              <a:t>EDIT CONTROL STATEMENT UNDER &gt; VIEW &gt; SLIDE MASTER &gt; SCROLL TO TOP &gt; CHANGE HEADER AND FOOTER</a:t>
-            </a:r>
+              <a:t>UNCLASSIFIED</a:t>
+            </a:r>
+            <a:endParaRPr lang="en-US" sz="700" b="1" dirty="0">
+              <a:solidFill>
+                <a:schemeClr val="tx1"/>
+              </a:solidFill>
+              <a:latin typeface="+mn-lt"/>
+              <a:cs typeface="Arial Bold" panose="020B0704020202020204" pitchFamily="34" charset="0"/>
+            </a:endParaRPr>
           </a:p>
         </p:txBody>
       </p:sp>
@@ -33956,12 +34054,12 @@
             <a:r>
               <a:rPr lang="en-US" sz="700" b="1" dirty="0">
                 <a:solidFill>
-                  <a:schemeClr val="tx1"/>
+                  <a:srgbClr val="2DAA27"/>
                 </a:solidFill>
                 <a:latin typeface="+mn-lt"/>
                 <a:cs typeface="Arial Bold" panose="020B0704020202020204" pitchFamily="34" charset="0"/>
               </a:rPr>
-              <a:t>EDIT CONTROL STATEMENT UNDER &gt; VIEW &gt; SLIDE MASTER &gt; SCROLL TO TOP &gt; CHANGE HEADER AND FOOTER</a:t>
+              <a:t>UNCLASSIFIED</a:t>
             </a:r>
           </a:p>
         </p:txBody>
@@ -35282,15 +35380,22 @@
               <a:defRPr/>
             </a:pPr>
             <a:r>
-              <a:rPr lang="en-US" sz="700" b="1">
+              <a:rPr lang="en-US" sz="700" b="1" dirty="0">
                 <a:solidFill>
-                  <a:schemeClr val="tx1"/>
+                  <a:srgbClr val="2DAA27"/>
                 </a:solidFill>
                 <a:latin typeface="+mn-lt"/>
                 <a:cs typeface="Arial Bold" panose="020B0704020202020204" pitchFamily="34" charset="0"/>
               </a:rPr>
-              <a:t>EDIT CONTROL STATEMENT UNDER &gt; VIEW &gt; SLIDE MASTER &gt; SCROLL TO TOP &gt; CHANGE HEADER AND FOOTER</a:t>
-            </a:r>
+              <a:t>UNCLASSIFIED</a:t>
+            </a:r>
+            <a:endParaRPr lang="en-US" sz="700" b="1" dirty="0">
+              <a:solidFill>
+                <a:schemeClr val="tx1"/>
+              </a:solidFill>
+              <a:latin typeface="+mn-lt"/>
+              <a:cs typeface="Arial Bold" panose="020B0704020202020204" pitchFamily="34" charset="0"/>
+            </a:endParaRPr>
           </a:p>
         </p:txBody>
       </p:sp>
@@ -35334,15 +35439,22 @@
               <a:defRPr/>
             </a:pPr>
             <a:r>
-              <a:rPr lang="en-US" sz="700" b="1">
+              <a:rPr lang="en-US" sz="700" b="1" dirty="0">
                 <a:solidFill>
-                  <a:schemeClr val="tx1"/>
+                  <a:srgbClr val="2DAA27"/>
                 </a:solidFill>
                 <a:latin typeface="+mn-lt"/>
                 <a:cs typeface="Arial Bold" panose="020B0704020202020204" pitchFamily="34" charset="0"/>
               </a:rPr>
-              <a:t>EDIT CONTROL STATEMENT UNDER &gt; VIEW &gt; SLIDE MASTER &gt; SCROLL TO TOP &gt; CHANGE HEADER AND FOOTER</a:t>
-            </a:r>
+              <a:t>UNCLASSIFIED</a:t>
+            </a:r>
+            <a:endParaRPr lang="en-US" sz="700" b="1" dirty="0">
+              <a:solidFill>
+                <a:schemeClr val="tx1"/>
+              </a:solidFill>
+              <a:latin typeface="+mn-lt"/>
+              <a:cs typeface="Arial Bold" panose="020B0704020202020204" pitchFamily="34" charset="0"/>
+            </a:endParaRPr>
           </a:p>
         </p:txBody>
       </p:sp>
@@ -35996,15 +36108,22 @@
               <a:defRPr/>
             </a:pPr>
             <a:r>
-              <a:rPr lang="en-US" sz="700" b="1">
+              <a:rPr lang="en-US" sz="700" b="1" dirty="0">
                 <a:solidFill>
-                  <a:schemeClr val="tx1"/>
+                  <a:srgbClr val="2DAA27"/>
                 </a:solidFill>
                 <a:latin typeface="+mn-lt"/>
                 <a:cs typeface="Arial Bold" panose="020B0704020202020204" pitchFamily="34" charset="0"/>
               </a:rPr>
-              <a:t>EDIT CONTROL STATEMENT UNDER &gt; VIEW &gt; SLIDE MASTER &gt; SCROLL TO TOP &gt; CHANGE HEADER AND FOOTER</a:t>
-            </a:r>
+              <a:t>UNCLASSIFIED</a:t>
+            </a:r>
+            <a:endParaRPr lang="en-US" sz="700" b="1" dirty="0">
+              <a:solidFill>
+                <a:schemeClr val="tx1"/>
+              </a:solidFill>
+              <a:latin typeface="+mn-lt"/>
+              <a:cs typeface="Arial Bold" panose="020B0704020202020204" pitchFamily="34" charset="0"/>
+            </a:endParaRPr>
           </a:p>
         </p:txBody>
       </p:sp>
@@ -36048,15 +36167,22 @@
               <a:defRPr/>
             </a:pPr>
             <a:r>
-              <a:rPr lang="en-US" sz="700" b="1">
+              <a:rPr lang="en-US" sz="700" b="1" dirty="0">
                 <a:solidFill>
-                  <a:schemeClr val="tx1"/>
+                  <a:srgbClr val="2DAA27"/>
                 </a:solidFill>
                 <a:latin typeface="+mn-lt"/>
                 <a:cs typeface="Arial Bold" panose="020B0704020202020204" pitchFamily="34" charset="0"/>
               </a:rPr>
-              <a:t>EDIT CONTROL STATEMENT UNDER &gt; VIEW &gt; SLIDE MASTER &gt; SCROLL TO TOP &gt; CHANGE HEADER AND FOOTER</a:t>
-            </a:r>
+              <a:t>UNCLASSIFIED</a:t>
+            </a:r>
+            <a:endParaRPr lang="en-US" sz="700" b="1" dirty="0">
+              <a:solidFill>
+                <a:schemeClr val="tx1"/>
+              </a:solidFill>
+              <a:latin typeface="+mn-lt"/>
+              <a:cs typeface="Arial Bold" panose="020B0704020202020204" pitchFamily="34" charset="0"/>
+            </a:endParaRPr>
           </a:p>
         </p:txBody>
       </p:sp>
@@ -36651,15 +36777,22 @@
               <a:defRPr/>
             </a:pPr>
             <a:r>
-              <a:rPr lang="en-US" sz="700" b="1">
+              <a:rPr lang="en-US" sz="700" b="1" dirty="0">
                 <a:solidFill>
-                  <a:schemeClr val="tx1"/>
+                  <a:srgbClr val="2DAA27"/>
                 </a:solidFill>
                 <a:latin typeface="+mn-lt"/>
                 <a:cs typeface="Arial Bold" panose="020B0704020202020204" pitchFamily="34" charset="0"/>
               </a:rPr>
-              <a:t>EDIT CONTROL STATEMENT UNDER &gt; VIEW &gt; SLIDE MASTER &gt; SCROLL TO TOP &gt; CHANGE HEADER AND FOOTER</a:t>
-            </a:r>
+              <a:t>UNCLASSIFIED</a:t>
+            </a:r>
+            <a:endParaRPr lang="en-US" sz="700" b="1" dirty="0">
+              <a:solidFill>
+                <a:schemeClr val="tx1"/>
+              </a:solidFill>
+              <a:latin typeface="+mn-lt"/>
+              <a:cs typeface="Arial Bold" panose="020B0704020202020204" pitchFamily="34" charset="0"/>
+            </a:endParaRPr>
           </a:p>
         </p:txBody>
       </p:sp>
@@ -36703,15 +36836,22 @@
               <a:defRPr/>
             </a:pPr>
             <a:r>
-              <a:rPr lang="en-US" sz="700" b="1">
+              <a:rPr lang="en-US" sz="700" b="1" dirty="0">
                 <a:solidFill>
-                  <a:schemeClr val="tx1"/>
+                  <a:srgbClr val="2DAA27"/>
                 </a:solidFill>
                 <a:latin typeface="+mn-lt"/>
                 <a:cs typeface="Arial Bold" panose="020B0704020202020204" pitchFamily="34" charset="0"/>
               </a:rPr>
-              <a:t>EDIT CONTROL STATEMENT UNDER &gt; VIEW &gt; SLIDE MASTER &gt; SCROLL TO TOP &gt; CHANGE HEADER AND FOOTER</a:t>
-            </a:r>
+              <a:t>UNCLASSIFIED</a:t>
+            </a:r>
+            <a:endParaRPr lang="en-US" sz="700" b="1" dirty="0">
+              <a:solidFill>
+                <a:schemeClr val="tx1"/>
+              </a:solidFill>
+              <a:latin typeface="+mn-lt"/>
+              <a:cs typeface="Arial Bold" panose="020B0704020202020204" pitchFamily="34" charset="0"/>
+            </a:endParaRPr>
           </a:p>
         </p:txBody>
       </p:sp>
@@ -40103,15 +40243,22 @@
               <a:defRPr/>
             </a:pPr>
             <a:r>
-              <a:rPr lang="en-US" sz="700" b="1">
+              <a:rPr lang="en-US" sz="700" b="1" dirty="0">
                 <a:solidFill>
-                  <a:schemeClr val="tx1"/>
+                  <a:srgbClr val="2DAA27"/>
                 </a:solidFill>
                 <a:latin typeface="+mn-lt"/>
                 <a:cs typeface="Arial Bold" panose="020B0704020202020204" pitchFamily="34" charset="0"/>
               </a:rPr>
-              <a:t>EDIT CONTROL STATEMENT UNDER &gt; VIEW &gt; SLIDE MASTER &gt; SCROLL TO TOP &gt; CHANGE HEADER AND FOOTER</a:t>
-            </a:r>
+              <a:t>UNCLASSIFIED</a:t>
+            </a:r>
+            <a:endParaRPr lang="en-US" sz="700" b="1" dirty="0">
+              <a:solidFill>
+                <a:schemeClr val="tx1"/>
+              </a:solidFill>
+              <a:latin typeface="+mn-lt"/>
+              <a:cs typeface="Arial Bold" panose="020B0704020202020204" pitchFamily="34" charset="0"/>
+            </a:endParaRPr>
           </a:p>
         </p:txBody>
       </p:sp>
@@ -40155,14 +40302,14 @@
               <a:defRPr/>
             </a:pPr>
             <a:r>
-              <a:rPr lang="en-US" sz="700" b="1">
+              <a:rPr lang="en-US" sz="700" b="1" dirty="0">
                 <a:solidFill>
-                  <a:schemeClr val="tx1"/>
+                  <a:srgbClr val="2DAA27"/>
                 </a:solidFill>
                 <a:latin typeface="+mn-lt"/>
                 <a:cs typeface="Arial Bold" panose="020B0704020202020204" pitchFamily="34" charset="0"/>
               </a:rPr>
-              <a:t>EDIT CONTROL STATEMENT UNDER &gt; VIEW &gt; SLIDE MASTER &gt; SCROLL TO TOP &gt; CHANGE HEADER AND FOOTER</a:t>
+              <a:t>UNCLASSIFIED</a:t>
             </a:r>
           </a:p>
         </p:txBody>
@@ -40419,7 +40566,7 @@
                 <a:latin typeface="+mn-lt"/>
                 <a:cs typeface="Arial Bold" panose="020B0704020202020204" pitchFamily="34" charset="0"/>
               </a:rPr>
-              <a:t>UNCLASSIFIED / GENERAL</a:t>
+              <a:t>UNCLASSIFIED</a:t>
             </a:r>
           </a:p>
         </p:txBody>
@@ -40471,7 +40618,7 @@
                 <a:latin typeface="+mn-lt"/>
                 <a:cs typeface="Arial Bold" panose="020B0704020202020204" pitchFamily="34" charset="0"/>
               </a:rPr>
-              <a:t>UNCLASSIFIED / GENERAL</a:t>
+              <a:t>UNCLASSIFIED</a:t>
             </a:r>
           </a:p>
         </p:txBody>
@@ -41212,7 +41359,7 @@
                 <a:latin typeface="+mn-lt"/>
                 <a:cs typeface="Arial Bold" panose="020B0704020202020204" pitchFamily="34" charset="0"/>
               </a:rPr>
-              <a:t>UNCLASSIFIED / GENERAL</a:t>
+              <a:t>UNCLASSIFIED</a:t>
             </a:r>
           </a:p>
         </p:txBody>
@@ -41264,7 +41411,7 @@
                 <a:latin typeface="+mn-lt"/>
                 <a:cs typeface="Arial Bold" panose="020B0704020202020204" pitchFamily="34" charset="0"/>
               </a:rPr>
-              <a:t>UNCLASSIFIED / GENERAL</a:t>
+              <a:t>UNCLASSIFIED</a:t>
             </a:r>
           </a:p>
         </p:txBody>
@@ -41841,13 +41988,13 @@
             <a:spLocks noGrp="1"/>
           </p:cNvSpPr>
           <p:nvPr>
-            <p:ph type="title"/>
+            <p:ph type="ctrTitle"/>
           </p:nvPr>
         </p:nvSpPr>
         <p:spPr>
           <a:xfrm>
-            <a:off x="548640" y="1140685"/>
-            <a:ext cx="8231293" cy="914400"/>
+            <a:off x="547688" y="2076539"/>
+            <a:ext cx="8261497" cy="1325880"/>
           </a:xfrm>
         </p:spPr>
         <p:txBody>
@@ -41855,7 +42002,7 @@
           <a:lstStyle/>
           <a:p>
             <a:r>
-              <a:rPr lang="en-US" sz="8000" dirty="0"/>
+              <a:rPr lang="en-US" sz="6600" dirty="0"/>
               <a:t>Python File IO</a:t>
             </a:r>
           </a:p>
@@ -41874,13 +42021,13 @@
             <a:spLocks noGrp="1"/>
           </p:cNvSpPr>
           <p:nvPr>
-            <p:ph type="subTitle" idx="4294967295"/>
+            <p:ph type="subTitle" idx="1"/>
           </p:nvPr>
         </p:nvSpPr>
         <p:spPr>
           <a:xfrm>
-            <a:off x="548640" y="2256740"/>
-            <a:ext cx="4942390" cy="1285111"/>
+            <a:off x="637953" y="3784732"/>
+            <a:ext cx="5029200" cy="457200"/>
           </a:xfrm>
         </p:spPr>
         <p:txBody>

</xml_diff>